<commit_message>
Added tasks and links
</commit_message>
<xml_diff>
--- a/PathogenDataCourse/SlideSets/ModelsOfEvolution.pptx
+++ b/PathogenDataCourse/SlideSets/ModelsOfEvolution.pptx
@@ -1724,7 +1724,7 @@
           <a:p>
             <a:fld id="{C4181D7C-81F1-BA48-B0CF-02C398C91972}" type="datetimeFigureOut">
               <a:rPr lang="en-US" smtClean="0"/>
-              <a:t>7/11/23</a:t>
+              <a:t>7/15/23</a:t>
             </a:fld>
             <a:endParaRPr lang="en-US"/>
           </a:p>
@@ -4778,7 +4778,7 @@
             <a:fld id="{197342E9-89D0-D246-B0E5-635614E13D75}" type="datetime1">
               <a:rPr lang="en-GB" smtClean="0"/>
               <a:pPr/>
-              <a:t>11/07/2023</a:t>
+              <a:t>15/07/2023</a:t>
             </a:fld>
             <a:endParaRPr lang="en-US" dirty="0"/>
           </a:p>
@@ -9396,7 +9396,7 @@
             <a:fld id="{197342E9-89D0-D246-B0E5-635614E13D75}" type="datetime1">
               <a:rPr lang="en-GB" smtClean="0"/>
               <a:pPr/>
-              <a:t>11/07/2023</a:t>
+              <a:t>15/07/2023</a:t>
             </a:fld>
             <a:endParaRPr lang="en-US" dirty="0"/>
           </a:p>
@@ -12479,7 +12479,7 @@
             <a:fld id="{197342E9-89D0-D246-B0E5-635614E13D75}" type="datetime1">
               <a:rPr lang="en-GB" smtClean="0"/>
               <a:pPr/>
-              <a:t>11/07/2023</a:t>
+              <a:t>15/07/2023</a:t>
             </a:fld>
             <a:endParaRPr lang="en-US" dirty="0"/>
           </a:p>
@@ -15606,14 +15606,14 @@
           <a:effectLst/>
           <a:extLst>
             <a:ext uri="{909E8E84-426E-40dd-AFC4-6F175D3DCCD1}">
-              <a14:hiddenFill xmlns="" xmlns:a14="http://schemas.microsoft.com/office/drawing/2010/main">
+              <a14:hiddenFill xmlns:a14="http://schemas.microsoft.com/office/drawing/2010/main" xmlns="">
                 <a:solidFill>
                   <a:schemeClr val="accent1"/>
                 </a:solidFill>
               </a14:hiddenFill>
             </a:ext>
             <a:ext uri="{91240B29-F687-4f45-9708-019B960494DF}">
-              <a14:hiddenLine xmlns="" xmlns:a14="http://schemas.microsoft.com/office/drawing/2010/main" w="9525">
+              <a14:hiddenLine xmlns:a14="http://schemas.microsoft.com/office/drawing/2010/main" xmlns="" w="9525">
                 <a:solidFill>
                   <a:schemeClr val="tx1"/>
                 </a:solidFill>
@@ -15623,7 +15623,7 @@
               </a14:hiddenLine>
             </a:ext>
             <a:ext uri="{AF507438-7753-43e0-B8FC-AC1667EBCBE1}">
-              <a14:hiddenEffects xmlns="" xmlns:a14="http://schemas.microsoft.com/office/drawing/2010/main">
+              <a14:hiddenEffects xmlns:a14="http://schemas.microsoft.com/office/drawing/2010/main" xmlns="">
                 <a:effectLst>
                   <a:outerShdw dist="35921" dir="2700000" algn="ctr" rotWithShape="0">
                     <a:schemeClr val="bg2"/>
@@ -16596,14 +16596,14 @@
           <a:effectLst/>
           <a:extLst>
             <a:ext uri="{909E8E84-426E-40dd-AFC4-6F175D3DCCD1}">
-              <a14:hiddenFill xmlns="" xmlns:a14="http://schemas.microsoft.com/office/drawing/2010/main">
+              <a14:hiddenFill xmlns:a14="http://schemas.microsoft.com/office/drawing/2010/main" xmlns="">
                 <a:solidFill>
                   <a:schemeClr val="accent1"/>
                 </a:solidFill>
               </a14:hiddenFill>
             </a:ext>
             <a:ext uri="{91240B29-F687-4f45-9708-019B960494DF}">
-              <a14:hiddenLine xmlns="" xmlns:a14="http://schemas.microsoft.com/office/drawing/2010/main" w="9525">
+              <a14:hiddenLine xmlns:a14="http://schemas.microsoft.com/office/drawing/2010/main" xmlns="" w="9525">
                 <a:solidFill>
                   <a:schemeClr val="tx1"/>
                 </a:solidFill>
@@ -16613,7 +16613,7 @@
               </a14:hiddenLine>
             </a:ext>
             <a:ext uri="{AF507438-7753-43e0-B8FC-AC1667EBCBE1}">
-              <a14:hiddenEffects xmlns="" xmlns:a14="http://schemas.microsoft.com/office/drawing/2010/main">
+              <a14:hiddenEffects xmlns:a14="http://schemas.microsoft.com/office/drawing/2010/main" xmlns="">
                 <a:effectLst>
                   <a:outerShdw dist="35921" dir="2700000" algn="ctr" rotWithShape="0">
                     <a:schemeClr val="bg2"/>
@@ -38971,14 +38971,14 @@
           <a:effectLst/>
           <a:extLst>
             <a:ext uri="{909E8E84-426E-40dd-AFC4-6F175D3DCCD1}">
-              <a14:hiddenFill xmlns="" xmlns:a14="http://schemas.microsoft.com/office/drawing/2010/main">
+              <a14:hiddenFill xmlns:a14="http://schemas.microsoft.com/office/drawing/2010/main" xmlns="">
                 <a:solidFill>
                   <a:schemeClr val="accent1"/>
                 </a:solidFill>
               </a14:hiddenFill>
             </a:ext>
             <a:ext uri="{91240B29-F687-4f45-9708-019B960494DF}">
-              <a14:hiddenLine xmlns="" xmlns:a14="http://schemas.microsoft.com/office/drawing/2010/main" w="9525">
+              <a14:hiddenLine xmlns:a14="http://schemas.microsoft.com/office/drawing/2010/main" xmlns="" w="9525">
                 <a:solidFill>
                   <a:schemeClr val="tx1"/>
                 </a:solidFill>
@@ -38988,7 +38988,7 @@
               </a14:hiddenLine>
             </a:ext>
             <a:ext uri="{AF507438-7753-43e0-B8FC-AC1667EBCBE1}">
-              <a14:hiddenEffects xmlns="" xmlns:a14="http://schemas.microsoft.com/office/drawing/2010/main">
+              <a14:hiddenEffects xmlns:a14="http://schemas.microsoft.com/office/drawing/2010/main" xmlns="">
                 <a:effectLst>
                   <a:outerShdw dist="35921" dir="2700000" algn="ctr" rotWithShape="0">
                     <a:schemeClr val="bg2"/>
@@ -40122,14 +40122,14 @@
           <a:effectLst/>
           <a:extLst>
             <a:ext uri="{909E8E84-426E-40dd-AFC4-6F175D3DCCD1}">
-              <a14:hiddenFill xmlns="" xmlns:a14="http://schemas.microsoft.com/office/drawing/2010/main">
+              <a14:hiddenFill xmlns:a14="http://schemas.microsoft.com/office/drawing/2010/main" xmlns="">
                 <a:solidFill>
                   <a:schemeClr val="accent1"/>
                 </a:solidFill>
               </a14:hiddenFill>
             </a:ext>
             <a:ext uri="{91240B29-F687-4f45-9708-019B960494DF}">
-              <a14:hiddenLine xmlns="" xmlns:a14="http://schemas.microsoft.com/office/drawing/2010/main" w="9525">
+              <a14:hiddenLine xmlns:a14="http://schemas.microsoft.com/office/drawing/2010/main" xmlns="" w="9525">
                 <a:solidFill>
                   <a:schemeClr val="tx1"/>
                 </a:solidFill>
@@ -40139,7 +40139,7 @@
               </a14:hiddenLine>
             </a:ext>
             <a:ext uri="{AF507438-7753-43e0-B8FC-AC1667EBCBE1}">
-              <a14:hiddenEffects xmlns="" xmlns:a14="http://schemas.microsoft.com/office/drawing/2010/main">
+              <a14:hiddenEffects xmlns:a14="http://schemas.microsoft.com/office/drawing/2010/main" xmlns="">
                 <a:effectLst>
                   <a:outerShdw dist="35921" dir="2700000" algn="ctr" rotWithShape="0">
                     <a:schemeClr val="bg2"/>
@@ -41007,6 +41007,15 @@
 </file>
 
 <file path=customXml/item1.xml><?xml version="1.0" encoding="utf-8"?>
+<?mso-contentType ?>
+<FormTemplates xmlns="http://schemas.microsoft.com/sharepoint/v3/contenttype/forms">
+  <Display>DocumentLibraryForm</Display>
+  <Edit>DocumentLibraryForm</Edit>
+  <New>DocumentLibraryForm</New>
+</FormTemplates>
+</file>
+
+<file path=customXml/item2.xml><?xml version="1.0" encoding="utf-8"?>
 <ct:contentTypeSchema xmlns:ct="http://schemas.microsoft.com/office/2006/metadata/contentType" xmlns:ma="http://schemas.microsoft.com/office/2006/metadata/properties/metaAttributes" ct:_="" ma:_="" ma:contentTypeName="Document" ma:contentTypeID="0x010100E248A64365211844BF30BC3ADD420261" ma:contentTypeVersion="11" ma:contentTypeDescription="Create a new document." ma:contentTypeScope="" ma:versionID="bf0b94b058452ed3cec91f89e664909d">
   <xsd:schema xmlns:xsd="http://www.w3.org/2001/XMLSchema" xmlns:xs="http://www.w3.org/2001/XMLSchema" xmlns:p="http://schemas.microsoft.com/office/2006/metadata/properties" xmlns:ns2="8dbe2aa3-3237-4830-85c4-3d48417ef302" xmlns:ns3="b317b901-4ab4-4161-80c3-da5df50c25bf" targetNamespace="http://schemas.microsoft.com/office/2006/metadata/properties" ma:root="true" ma:fieldsID="d988d784501c0b668dd73c0ebdbd98a4" ns2:_="" ns3:_="">
     <xsd:import namespace="8dbe2aa3-3237-4830-85c4-3d48417ef302"/>
@@ -41217,15 +41226,6 @@
 </ct:contentTypeSchema>
 </file>
 
-<file path=customXml/item2.xml><?xml version="1.0" encoding="utf-8"?>
-<?mso-contentType ?>
-<FormTemplates xmlns="http://schemas.microsoft.com/sharepoint/v3/contenttype/forms">
-  <Display>DocumentLibraryForm</Display>
-  <Edit>DocumentLibraryForm</Edit>
-  <New>DocumentLibraryForm</New>
-</FormTemplates>
-</file>
-
 <file path=customXml/item3.xml><?xml version="1.0" encoding="utf-8"?>
 <p:properties xmlns:p="http://schemas.microsoft.com/office/2006/metadata/properties" xmlns:xsi="http://www.w3.org/2001/XMLSchema-instance" xmlns:pc="http://schemas.microsoft.com/office/infopath/2007/PartnerControls">
   <documentManagement/>
@@ -41233,6 +41233,14 @@
 </file>
 
 <file path=customXml/itemProps1.xml><?xml version="1.0" encoding="utf-8"?>
+<ds:datastoreItem xmlns:ds="http://schemas.openxmlformats.org/officeDocument/2006/customXml" ds:itemID="{B1063616-57F3-4C87-BB7F-2974CF36DE76}">
+  <ds:schemaRefs>
+    <ds:schemaRef ds:uri="http://schemas.microsoft.com/sharepoint/v3/contenttype/forms"/>
+  </ds:schemaRefs>
+</ds:datastoreItem>
+</file>
+
+<file path=customXml/itemProps2.xml><?xml version="1.0" encoding="utf-8"?>
 <ds:datastoreItem xmlns:ds="http://schemas.openxmlformats.org/officeDocument/2006/customXml" ds:itemID="{72E4F038-6994-4608-A1EA-AF583DA06B5C}">
   <ds:schemaRefs>
     <ds:schemaRef ds:uri="http://schemas.microsoft.com/office/2006/metadata/contentType"/>
@@ -41247,14 +41255,6 @@
     <ds:schemaRef ds:uri="http://purl.org/dc/elements/1.1/"/>
     <ds:schemaRef ds:uri="http://purl.org/dc/terms/"/>
     <ds:schemaRef ds:uri="http://schemas.microsoft.com/internal/obd"/>
-  </ds:schemaRefs>
-</ds:datastoreItem>
-</file>
-
-<file path=customXml/itemProps2.xml><?xml version="1.0" encoding="utf-8"?>
-<ds:datastoreItem xmlns:ds="http://schemas.openxmlformats.org/officeDocument/2006/customXml" ds:itemID="{B1063616-57F3-4C87-BB7F-2974CF36DE76}">
-  <ds:schemaRefs>
-    <ds:schemaRef ds:uri="http://schemas.microsoft.com/sharepoint/v3/contenttype/forms"/>
   </ds:schemaRefs>
 </ds:datastoreItem>
 </file>

</xml_diff>